<commit_message>
fix errors and out of date content in module 4 lectures
</commit_message>
<xml_diff>
--- a/LectureFiles/cbw-cshl/2017/RNASeq_Module4_Tutorial.pptx
+++ b/LectureFiles/cbw-cshl/2017/RNASeq_Module4_Tutorial.pptx
@@ -5,10 +5,10 @@
     <p:sldMasterId id="2147483648" r:id="rId1"/>
   </p:sldMasterIdLst>
   <p:notesMasterIdLst>
-    <p:notesMasterId r:id="rId16"/>
+    <p:notesMasterId r:id="rId14"/>
   </p:notesMasterIdLst>
   <p:handoutMasterIdLst>
-    <p:handoutMasterId r:id="rId17"/>
+    <p:handoutMasterId r:id="rId15"/>
   </p:handoutMasterIdLst>
   <p:sldIdLst>
     <p:sldId id="341" r:id="rId2"/>
@@ -22,9 +22,7 @@
     <p:sldId id="518" r:id="rId10"/>
     <p:sldId id="519" r:id="rId11"/>
     <p:sldId id="520" r:id="rId12"/>
-    <p:sldId id="521" r:id="rId13"/>
-    <p:sldId id="522" r:id="rId14"/>
-    <p:sldId id="512" r:id="rId15"/>
+    <p:sldId id="512" r:id="rId13"/>
   </p:sldIdLst>
   <p:sldSz cx="9144000" cy="6858000" type="screen4x3"/>
   <p:notesSz cx="7315200" cy="9601200"/>
@@ -263,7 +261,7 @@
               <a:pPr>
                 <a:defRPr/>
               </a:pPr>
-              <a:t>3/4/17</a:t>
+              <a:t>3/26/17</a:t>
             </a:fld>
             <a:endParaRPr lang="en-US"/>
           </a:p>
@@ -478,7 +476,7 @@
               <a:pPr>
                 <a:defRPr/>
               </a:pPr>
-              <a:t>3/4/17</a:t>
+              <a:t>3/26/17</a:t>
             </a:fld>
             <a:endParaRPr lang="en-US"/>
           </a:p>
@@ -1060,273 +1058,6 @@
 </p:notes>
 </file>
 
-<file path=ppt/notesSlides/notesSlide10.xml><?xml version="1.0" encoding="utf-8"?>
-<p:notes xmlns:a="http://schemas.openxmlformats.org/drawingml/2006/main" xmlns:r="http://schemas.openxmlformats.org/officeDocument/2006/relationships" xmlns:p="http://schemas.openxmlformats.org/presentationml/2006/main">
-  <p:cSld>
-    <p:spTree>
-      <p:nvGrpSpPr>
-        <p:cNvPr id="1" name=""/>
-        <p:cNvGrpSpPr/>
-        <p:nvPr/>
-      </p:nvGrpSpPr>
-      <p:grpSpPr>
-        <a:xfrm>
-          <a:off x="0" y="0"/>
-          <a:ext cx="0" cy="0"/>
-          <a:chOff x="0" y="0"/>
-          <a:chExt cx="0" cy="0"/>
-        </a:xfrm>
-      </p:grpSpPr>
-      <p:sp>
-        <p:nvSpPr>
-          <p:cNvPr id="34817" name="Slide Image Placeholder 1"/>
-          <p:cNvSpPr>
-            <a:spLocks noGrp="1" noRot="1" noChangeAspect="1"/>
-          </p:cNvSpPr>
-          <p:nvPr>
-            <p:ph type="sldImg"/>
-          </p:nvPr>
-        </p:nvSpPr>
-        <p:spPr bwMode="auto">
-          <a:noFill/>
-          <a:ln>
-            <a:solidFill>
-              <a:srgbClr val="000000"/>
-            </a:solidFill>
-            <a:miter lim="800000"/>
-            <a:headEnd/>
-            <a:tailEnd/>
-          </a:ln>
-          <a:extLst>
-            <a:ext uri="{909E8E84-426E-40dd-AFC4-6F175D3DCCD1}">
-              <a14:hiddenFill xmlns:a14="http://schemas.microsoft.com/office/drawing/2010/main">
-                <a:solidFill>
-                  <a:srgbClr val="FFFFFF"/>
-                </a:solidFill>
-              </a14:hiddenFill>
-            </a:ext>
-            <a:ext uri="{FAA26D3D-D897-4be2-8F04-BA451C77F1D7}">
-              <ma14:placeholderFlag xmlns:ma14="http://schemas.microsoft.com/office/mac/drawingml/2011/main" val="1"/>
-            </a:ext>
-          </a:extLst>
-        </p:spPr>
-      </p:sp>
-      <p:sp>
-        <p:nvSpPr>
-          <p:cNvPr id="34818" name="Notes Placeholder 2"/>
-          <p:cNvSpPr>
-            <a:spLocks noGrp="1"/>
-          </p:cNvSpPr>
-          <p:nvPr>
-            <p:ph type="body" idx="1"/>
-          </p:nvPr>
-        </p:nvSpPr>
-        <p:spPr bwMode="auto">
-          <a:noFill/>
-          <a:extLst>
-            <a:ext uri="{909E8E84-426E-40dd-AFC4-6F175D3DCCD1}">
-              <a14:hiddenFill xmlns:a14="http://schemas.microsoft.com/office/drawing/2010/main">
-                <a:solidFill>
-                  <a:srgbClr val="FFFFFF"/>
-                </a:solidFill>
-              </a14:hiddenFill>
-            </a:ext>
-            <a:ext uri="{91240B29-F687-4f45-9708-019B960494DF}">
-              <a14:hiddenLine xmlns:a14="http://schemas.microsoft.com/office/drawing/2010/main" w="9525">
-                <a:solidFill>
-                  <a:srgbClr val="000000"/>
-                </a:solidFill>
-                <a:miter lim="800000"/>
-                <a:headEnd/>
-                <a:tailEnd/>
-              </a14:hiddenLine>
-            </a:ext>
-            <a:ext uri="{FAA26D3D-D897-4be2-8F04-BA451C77F1D7}">
-              <ma14:placeholderFlag xmlns:ma14="http://schemas.microsoft.com/office/mac/drawingml/2011/main" val="1"/>
-            </a:ext>
-          </a:extLst>
-        </p:spPr>
-        <p:txBody>
-          <a:bodyPr wrap="square" numCol="1" anchor="t" anchorCtr="0" compatLnSpc="1">
-            <a:prstTxWarp prst="textNoShape">
-              <a:avLst/>
-            </a:prstTxWarp>
-          </a:bodyPr>
-          <a:lstStyle/>
-          <a:p>
-            <a:endParaRPr lang="en-US">
-              <a:latin typeface="Calibri" charset="0"/>
-              <a:ea typeface="ＭＳ Ｐゴシック" charset="0"/>
-              <a:cs typeface="ＭＳ Ｐゴシック" charset="0"/>
-            </a:endParaRPr>
-          </a:p>
-        </p:txBody>
-      </p:sp>
-      <p:sp>
-        <p:nvSpPr>
-          <p:cNvPr id="34819" name="Slide Number Placeholder 3"/>
-          <p:cNvSpPr>
-            <a:spLocks noGrp="1"/>
-          </p:cNvSpPr>
-          <p:nvPr>
-            <p:ph type="sldNum" sz="quarter" idx="5"/>
-          </p:nvPr>
-        </p:nvSpPr>
-        <p:spPr bwMode="auto">
-          <a:noFill/>
-          <a:extLst>
-            <a:ext uri="{909E8E84-426E-40dd-AFC4-6F175D3DCCD1}">
-              <a14:hiddenFill xmlns:a14="http://schemas.microsoft.com/office/drawing/2010/main">
-                <a:solidFill>
-                  <a:srgbClr val="FFFFFF"/>
-                </a:solidFill>
-              </a14:hiddenFill>
-            </a:ext>
-            <a:ext uri="{91240B29-F687-4f45-9708-019B960494DF}">
-              <a14:hiddenLine xmlns:a14="http://schemas.microsoft.com/office/drawing/2010/main" w="9525">
-                <a:solidFill>
-                  <a:srgbClr val="000000"/>
-                </a:solidFill>
-                <a:miter lim="800000"/>
-                <a:headEnd/>
-                <a:tailEnd/>
-              </a14:hiddenLine>
-            </a:ext>
-          </a:extLst>
-        </p:spPr>
-        <p:txBody>
-          <a:bodyPr/>
-          <a:lstStyle>
-            <a:lvl1pPr eaLnBrk="0" hangingPunct="0">
-              <a:defRPr sz="2400">
-                <a:solidFill>
-                  <a:schemeClr val="tx1"/>
-                </a:solidFill>
-                <a:latin typeface="Arial" charset="0"/>
-                <a:ea typeface="ＭＳ Ｐゴシック" charset="0"/>
-                <a:cs typeface="ＭＳ Ｐゴシック" charset="0"/>
-              </a:defRPr>
-            </a:lvl1pPr>
-            <a:lvl2pPr marL="742950" indent="-285750" eaLnBrk="0" hangingPunct="0">
-              <a:defRPr sz="2400">
-                <a:solidFill>
-                  <a:schemeClr val="tx1"/>
-                </a:solidFill>
-                <a:latin typeface="Arial" charset="0"/>
-                <a:ea typeface="ＭＳ Ｐゴシック" charset="0"/>
-              </a:defRPr>
-            </a:lvl2pPr>
-            <a:lvl3pPr marL="1143000" indent="-228600" eaLnBrk="0" hangingPunct="0">
-              <a:defRPr sz="2400">
-                <a:solidFill>
-                  <a:schemeClr val="tx1"/>
-                </a:solidFill>
-                <a:latin typeface="Arial" charset="0"/>
-                <a:ea typeface="ＭＳ Ｐゴシック" charset="0"/>
-              </a:defRPr>
-            </a:lvl3pPr>
-            <a:lvl4pPr marL="1600200" indent="-228600" eaLnBrk="0" hangingPunct="0">
-              <a:defRPr sz="2400">
-                <a:solidFill>
-                  <a:schemeClr val="tx1"/>
-                </a:solidFill>
-                <a:latin typeface="Arial" charset="0"/>
-                <a:ea typeface="ＭＳ Ｐゴシック" charset="0"/>
-              </a:defRPr>
-            </a:lvl4pPr>
-            <a:lvl5pPr marL="2057400" indent="-228600" eaLnBrk="0" hangingPunct="0">
-              <a:defRPr sz="2400">
-                <a:solidFill>
-                  <a:schemeClr val="tx1"/>
-                </a:solidFill>
-                <a:latin typeface="Arial" charset="0"/>
-                <a:ea typeface="ＭＳ Ｐゴシック" charset="0"/>
-              </a:defRPr>
-            </a:lvl5pPr>
-            <a:lvl6pPr marL="2514600" indent="-228600" eaLnBrk="0" fontAlgn="base" hangingPunct="0">
-              <a:spcBef>
-                <a:spcPct val="0"/>
-              </a:spcBef>
-              <a:spcAft>
-                <a:spcPct val="0"/>
-              </a:spcAft>
-              <a:defRPr sz="2400">
-                <a:solidFill>
-                  <a:schemeClr val="tx1"/>
-                </a:solidFill>
-                <a:latin typeface="Arial" charset="0"/>
-                <a:ea typeface="ＭＳ Ｐゴシック" charset="0"/>
-              </a:defRPr>
-            </a:lvl6pPr>
-            <a:lvl7pPr marL="2971800" indent="-228600" eaLnBrk="0" fontAlgn="base" hangingPunct="0">
-              <a:spcBef>
-                <a:spcPct val="0"/>
-              </a:spcBef>
-              <a:spcAft>
-                <a:spcPct val="0"/>
-              </a:spcAft>
-              <a:defRPr sz="2400">
-                <a:solidFill>
-                  <a:schemeClr val="tx1"/>
-                </a:solidFill>
-                <a:latin typeface="Arial" charset="0"/>
-                <a:ea typeface="ＭＳ Ｐゴシック" charset="0"/>
-              </a:defRPr>
-            </a:lvl7pPr>
-            <a:lvl8pPr marL="3429000" indent="-228600" eaLnBrk="0" fontAlgn="base" hangingPunct="0">
-              <a:spcBef>
-                <a:spcPct val="0"/>
-              </a:spcBef>
-              <a:spcAft>
-                <a:spcPct val="0"/>
-              </a:spcAft>
-              <a:defRPr sz="2400">
-                <a:solidFill>
-                  <a:schemeClr val="tx1"/>
-                </a:solidFill>
-                <a:latin typeface="Arial" charset="0"/>
-                <a:ea typeface="ＭＳ Ｐゴシック" charset="0"/>
-              </a:defRPr>
-            </a:lvl8pPr>
-            <a:lvl9pPr marL="3886200" indent="-228600" eaLnBrk="0" fontAlgn="base" hangingPunct="0">
-              <a:spcBef>
-                <a:spcPct val="0"/>
-              </a:spcBef>
-              <a:spcAft>
-                <a:spcPct val="0"/>
-              </a:spcAft>
-              <a:defRPr sz="2400">
-                <a:solidFill>
-                  <a:schemeClr val="tx1"/>
-                </a:solidFill>
-                <a:latin typeface="Arial" charset="0"/>
-                <a:ea typeface="ＭＳ Ｐゴシック" charset="0"/>
-              </a:defRPr>
-            </a:lvl9pPr>
-          </a:lstStyle>
-          <a:p>
-            <a:pPr eaLnBrk="1" hangingPunct="1"/>
-            <a:fld id="{18FFCF2A-2E5F-1F49-A505-20D05B3D195D}" type="slidenum">
-              <a:rPr lang="en-US" sz="1300">
-                <a:latin typeface="Calibri" charset="0"/>
-              </a:rPr>
-              <a:pPr eaLnBrk="1" hangingPunct="1"/>
-              <a:t>13</a:t>
-            </a:fld>
-            <a:endParaRPr lang="en-US" sz="1300">
-              <a:latin typeface="Calibri" charset="0"/>
-            </a:endParaRPr>
-          </a:p>
-        </p:txBody>
-      </p:sp>
-    </p:spTree>
-  </p:cSld>
-  <p:clrMapOvr>
-    <a:masterClrMapping/>
-  </p:clrMapOvr>
-</p:notes>
-</file>
-
 <file path=ppt/notesSlides/notesSlide2.xml><?xml version="1.0" encoding="utf-8"?>
 <p:notes xmlns:a="http://schemas.openxmlformats.org/drawingml/2006/main" xmlns:r="http://schemas.openxmlformats.org/officeDocument/2006/relationships" xmlns:p="http://schemas.openxmlformats.org/presentationml/2006/main">
   <p:cSld>
@@ -3181,273 +2912,6 @@
               </a:rPr>
               <a:pPr eaLnBrk="1" hangingPunct="1"/>
               <a:t>11</a:t>
-            </a:fld>
-            <a:endParaRPr lang="en-US" sz="1300">
-              <a:latin typeface="Calibri" charset="0"/>
-            </a:endParaRPr>
-          </a:p>
-        </p:txBody>
-      </p:sp>
-    </p:spTree>
-  </p:cSld>
-  <p:clrMapOvr>
-    <a:masterClrMapping/>
-  </p:clrMapOvr>
-</p:notes>
-</file>
-
-<file path=ppt/notesSlides/notesSlide9.xml><?xml version="1.0" encoding="utf-8"?>
-<p:notes xmlns:a="http://schemas.openxmlformats.org/drawingml/2006/main" xmlns:r="http://schemas.openxmlformats.org/officeDocument/2006/relationships" xmlns:p="http://schemas.openxmlformats.org/presentationml/2006/main">
-  <p:cSld>
-    <p:spTree>
-      <p:nvGrpSpPr>
-        <p:cNvPr id="1" name=""/>
-        <p:cNvGrpSpPr/>
-        <p:nvPr/>
-      </p:nvGrpSpPr>
-      <p:grpSpPr>
-        <a:xfrm>
-          <a:off x="0" y="0"/>
-          <a:ext cx="0" cy="0"/>
-          <a:chOff x="0" y="0"/>
-          <a:chExt cx="0" cy="0"/>
-        </a:xfrm>
-      </p:grpSpPr>
-      <p:sp>
-        <p:nvSpPr>
-          <p:cNvPr id="32769" name="Slide Image Placeholder 1"/>
-          <p:cNvSpPr>
-            <a:spLocks noGrp="1" noRot="1" noChangeAspect="1"/>
-          </p:cNvSpPr>
-          <p:nvPr>
-            <p:ph type="sldImg"/>
-          </p:nvPr>
-        </p:nvSpPr>
-        <p:spPr bwMode="auto">
-          <a:noFill/>
-          <a:ln>
-            <a:solidFill>
-              <a:srgbClr val="000000"/>
-            </a:solidFill>
-            <a:miter lim="800000"/>
-            <a:headEnd/>
-            <a:tailEnd/>
-          </a:ln>
-          <a:extLst>
-            <a:ext uri="{909E8E84-426E-40dd-AFC4-6F175D3DCCD1}">
-              <a14:hiddenFill xmlns:a14="http://schemas.microsoft.com/office/drawing/2010/main">
-                <a:solidFill>
-                  <a:srgbClr val="FFFFFF"/>
-                </a:solidFill>
-              </a14:hiddenFill>
-            </a:ext>
-            <a:ext uri="{FAA26D3D-D897-4be2-8F04-BA451C77F1D7}">
-              <ma14:placeholderFlag xmlns:ma14="http://schemas.microsoft.com/office/mac/drawingml/2011/main" val="1"/>
-            </a:ext>
-          </a:extLst>
-        </p:spPr>
-      </p:sp>
-      <p:sp>
-        <p:nvSpPr>
-          <p:cNvPr id="32770" name="Notes Placeholder 2"/>
-          <p:cNvSpPr>
-            <a:spLocks noGrp="1"/>
-          </p:cNvSpPr>
-          <p:nvPr>
-            <p:ph type="body" idx="1"/>
-          </p:nvPr>
-        </p:nvSpPr>
-        <p:spPr bwMode="auto">
-          <a:noFill/>
-          <a:extLst>
-            <a:ext uri="{909E8E84-426E-40dd-AFC4-6F175D3DCCD1}">
-              <a14:hiddenFill xmlns:a14="http://schemas.microsoft.com/office/drawing/2010/main">
-                <a:solidFill>
-                  <a:srgbClr val="FFFFFF"/>
-                </a:solidFill>
-              </a14:hiddenFill>
-            </a:ext>
-            <a:ext uri="{91240B29-F687-4f45-9708-019B960494DF}">
-              <a14:hiddenLine xmlns:a14="http://schemas.microsoft.com/office/drawing/2010/main" w="9525">
-                <a:solidFill>
-                  <a:srgbClr val="000000"/>
-                </a:solidFill>
-                <a:miter lim="800000"/>
-                <a:headEnd/>
-                <a:tailEnd/>
-              </a14:hiddenLine>
-            </a:ext>
-            <a:ext uri="{FAA26D3D-D897-4be2-8F04-BA451C77F1D7}">
-              <ma14:placeholderFlag xmlns:ma14="http://schemas.microsoft.com/office/mac/drawingml/2011/main" val="1"/>
-            </a:ext>
-          </a:extLst>
-        </p:spPr>
-        <p:txBody>
-          <a:bodyPr wrap="square" numCol="1" anchor="t" anchorCtr="0" compatLnSpc="1">
-            <a:prstTxWarp prst="textNoShape">
-              <a:avLst/>
-            </a:prstTxWarp>
-          </a:bodyPr>
-          <a:lstStyle/>
-          <a:p>
-            <a:endParaRPr lang="en-US">
-              <a:latin typeface="Calibri" charset="0"/>
-              <a:ea typeface="ＭＳ Ｐゴシック" charset="0"/>
-              <a:cs typeface="ＭＳ Ｐゴシック" charset="0"/>
-            </a:endParaRPr>
-          </a:p>
-        </p:txBody>
-      </p:sp>
-      <p:sp>
-        <p:nvSpPr>
-          <p:cNvPr id="32771" name="Slide Number Placeholder 3"/>
-          <p:cNvSpPr>
-            <a:spLocks noGrp="1"/>
-          </p:cNvSpPr>
-          <p:nvPr>
-            <p:ph type="sldNum" sz="quarter" idx="5"/>
-          </p:nvPr>
-        </p:nvSpPr>
-        <p:spPr bwMode="auto">
-          <a:noFill/>
-          <a:extLst>
-            <a:ext uri="{909E8E84-426E-40dd-AFC4-6F175D3DCCD1}">
-              <a14:hiddenFill xmlns:a14="http://schemas.microsoft.com/office/drawing/2010/main">
-                <a:solidFill>
-                  <a:srgbClr val="FFFFFF"/>
-                </a:solidFill>
-              </a14:hiddenFill>
-            </a:ext>
-            <a:ext uri="{91240B29-F687-4f45-9708-019B960494DF}">
-              <a14:hiddenLine xmlns:a14="http://schemas.microsoft.com/office/drawing/2010/main" w="9525">
-                <a:solidFill>
-                  <a:srgbClr val="000000"/>
-                </a:solidFill>
-                <a:miter lim="800000"/>
-                <a:headEnd/>
-                <a:tailEnd/>
-              </a14:hiddenLine>
-            </a:ext>
-          </a:extLst>
-        </p:spPr>
-        <p:txBody>
-          <a:bodyPr/>
-          <a:lstStyle>
-            <a:lvl1pPr eaLnBrk="0" hangingPunct="0">
-              <a:defRPr sz="2400">
-                <a:solidFill>
-                  <a:schemeClr val="tx1"/>
-                </a:solidFill>
-                <a:latin typeface="Arial" charset="0"/>
-                <a:ea typeface="ＭＳ Ｐゴシック" charset="0"/>
-                <a:cs typeface="ＭＳ Ｐゴシック" charset="0"/>
-              </a:defRPr>
-            </a:lvl1pPr>
-            <a:lvl2pPr marL="742950" indent="-285750" eaLnBrk="0" hangingPunct="0">
-              <a:defRPr sz="2400">
-                <a:solidFill>
-                  <a:schemeClr val="tx1"/>
-                </a:solidFill>
-                <a:latin typeface="Arial" charset="0"/>
-                <a:ea typeface="ＭＳ Ｐゴシック" charset="0"/>
-              </a:defRPr>
-            </a:lvl2pPr>
-            <a:lvl3pPr marL="1143000" indent="-228600" eaLnBrk="0" hangingPunct="0">
-              <a:defRPr sz="2400">
-                <a:solidFill>
-                  <a:schemeClr val="tx1"/>
-                </a:solidFill>
-                <a:latin typeface="Arial" charset="0"/>
-                <a:ea typeface="ＭＳ Ｐゴシック" charset="0"/>
-              </a:defRPr>
-            </a:lvl3pPr>
-            <a:lvl4pPr marL="1600200" indent="-228600" eaLnBrk="0" hangingPunct="0">
-              <a:defRPr sz="2400">
-                <a:solidFill>
-                  <a:schemeClr val="tx1"/>
-                </a:solidFill>
-                <a:latin typeface="Arial" charset="0"/>
-                <a:ea typeface="ＭＳ Ｐゴシック" charset="0"/>
-              </a:defRPr>
-            </a:lvl4pPr>
-            <a:lvl5pPr marL="2057400" indent="-228600" eaLnBrk="0" hangingPunct="0">
-              <a:defRPr sz="2400">
-                <a:solidFill>
-                  <a:schemeClr val="tx1"/>
-                </a:solidFill>
-                <a:latin typeface="Arial" charset="0"/>
-                <a:ea typeface="ＭＳ Ｐゴシック" charset="0"/>
-              </a:defRPr>
-            </a:lvl5pPr>
-            <a:lvl6pPr marL="2514600" indent="-228600" eaLnBrk="0" fontAlgn="base" hangingPunct="0">
-              <a:spcBef>
-                <a:spcPct val="0"/>
-              </a:spcBef>
-              <a:spcAft>
-                <a:spcPct val="0"/>
-              </a:spcAft>
-              <a:defRPr sz="2400">
-                <a:solidFill>
-                  <a:schemeClr val="tx1"/>
-                </a:solidFill>
-                <a:latin typeface="Arial" charset="0"/>
-                <a:ea typeface="ＭＳ Ｐゴシック" charset="0"/>
-              </a:defRPr>
-            </a:lvl6pPr>
-            <a:lvl7pPr marL="2971800" indent="-228600" eaLnBrk="0" fontAlgn="base" hangingPunct="0">
-              <a:spcBef>
-                <a:spcPct val="0"/>
-              </a:spcBef>
-              <a:spcAft>
-                <a:spcPct val="0"/>
-              </a:spcAft>
-              <a:defRPr sz="2400">
-                <a:solidFill>
-                  <a:schemeClr val="tx1"/>
-                </a:solidFill>
-                <a:latin typeface="Arial" charset="0"/>
-                <a:ea typeface="ＭＳ Ｐゴシック" charset="0"/>
-              </a:defRPr>
-            </a:lvl7pPr>
-            <a:lvl8pPr marL="3429000" indent="-228600" eaLnBrk="0" fontAlgn="base" hangingPunct="0">
-              <a:spcBef>
-                <a:spcPct val="0"/>
-              </a:spcBef>
-              <a:spcAft>
-                <a:spcPct val="0"/>
-              </a:spcAft>
-              <a:defRPr sz="2400">
-                <a:solidFill>
-                  <a:schemeClr val="tx1"/>
-                </a:solidFill>
-                <a:latin typeface="Arial" charset="0"/>
-                <a:ea typeface="ＭＳ Ｐゴシック" charset="0"/>
-              </a:defRPr>
-            </a:lvl8pPr>
-            <a:lvl9pPr marL="3886200" indent="-228600" eaLnBrk="0" fontAlgn="base" hangingPunct="0">
-              <a:spcBef>
-                <a:spcPct val="0"/>
-              </a:spcBef>
-              <a:spcAft>
-                <a:spcPct val="0"/>
-              </a:spcAft>
-              <a:defRPr sz="2400">
-                <a:solidFill>
-                  <a:schemeClr val="tx1"/>
-                </a:solidFill>
-                <a:latin typeface="Arial" charset="0"/>
-                <a:ea typeface="ＭＳ Ｐゴシック" charset="0"/>
-              </a:defRPr>
-            </a:lvl9pPr>
-          </a:lstStyle>
-          <a:p>
-            <a:pPr eaLnBrk="1" hangingPunct="1"/>
-            <a:fld id="{94813FC5-EAC3-034A-8977-67113298044A}" type="slidenum">
-              <a:rPr lang="en-US" sz="1300">
-                <a:latin typeface="Calibri" charset="0"/>
-              </a:rPr>
-              <a:pPr eaLnBrk="1" hangingPunct="1"/>
-              <a:t>12</a:t>
             </a:fld>
             <a:endParaRPr lang="en-US" sz="1300">
               <a:latin typeface="Calibri" charset="0"/>
@@ -5910,7 +5374,7 @@
               <a:pPr>
                 <a:defRPr/>
               </a:pPr>
-              <a:t>3/4/17</a:t>
+              <a:t>3/26/17</a:t>
             </a:fld>
             <a:endParaRPr lang="en-US"/>
           </a:p>
@@ -6574,8 +6038,33 @@
                 <a:latin typeface="Calibri" charset="0"/>
                 <a:ea typeface="ＭＳ Ｐゴシック" charset="0"/>
               </a:rPr>
-              <a:t>of merged GTFs from each cufflinks mode</a:t>
-            </a:r>
+              <a:t>of merged GTFs from each </a:t>
+            </a:r>
+            <a:r>
+              <a:rPr lang="en-US" dirty="0" err="1" smtClean="0">
+                <a:latin typeface="Calibri" charset="0"/>
+                <a:ea typeface="ＭＳ Ｐゴシック" charset="0"/>
+              </a:rPr>
+              <a:t>S</a:t>
+            </a:r>
+            <a:r>
+              <a:rPr lang="en-US" dirty="0" err="1" smtClean="0">
+                <a:latin typeface="Calibri" charset="0"/>
+                <a:ea typeface="ＭＳ Ｐゴシック" charset="0"/>
+              </a:rPr>
+              <a:t>tringTie</a:t>
+            </a:r>
+            <a:r>
+              <a:rPr lang="en-US" dirty="0" smtClean="0">
+                <a:latin typeface="Calibri" charset="0"/>
+                <a:ea typeface="ＭＳ Ｐゴシック" charset="0"/>
+              </a:rPr>
+              <a:t> mode</a:t>
+            </a:r>
+            <a:endParaRPr lang="en-US" dirty="0">
+              <a:latin typeface="Calibri" charset="0"/>
+              <a:ea typeface="ＭＳ Ｐゴシック" charset="0"/>
+            </a:endParaRPr>
           </a:p>
         </p:txBody>
       </p:sp>
@@ -6937,12 +6426,30 @@
           <a:lstStyle/>
           <a:p>
             <a:r>
-              <a:rPr lang="en-US">
+              <a:rPr lang="en-US" dirty="0">
                 <a:latin typeface="Calibri" charset="0"/>
                 <a:ea typeface="ＭＳ Ｐゴシック" charset="0"/>
               </a:rPr>
-              <a:t>Comparison of merged GTFs from each cufflinks mode</a:t>
-            </a:r>
+              <a:t>Comparison of merged GTFs from each </a:t>
+            </a:r>
+            <a:r>
+              <a:rPr lang="en-US" dirty="0" err="1" smtClean="0">
+                <a:latin typeface="Calibri" charset="0"/>
+                <a:ea typeface="ＭＳ Ｐゴシック" charset="0"/>
+              </a:rPr>
+              <a:t>StringTie</a:t>
+            </a:r>
+            <a:r>
+              <a:rPr lang="en-US" dirty="0" smtClean="0">
+                <a:latin typeface="Calibri" charset="0"/>
+                <a:ea typeface="ＭＳ Ｐゴシック" charset="0"/>
+              </a:rPr>
+              <a:t> mode</a:t>
+            </a:r>
+            <a:endParaRPr lang="en-US" dirty="0">
+              <a:latin typeface="Calibri" charset="0"/>
+              <a:ea typeface="ＭＳ Ｐゴシック" charset="0"/>
+            </a:endParaRPr>
           </a:p>
         </p:txBody>
       </p:sp>
@@ -7180,267 +6687,6 @@
 </file>
 
 <file path=ppt/slides/slide12.xml><?xml version="1.0" encoding="utf-8"?>
-<p:sld xmlns:a="http://schemas.openxmlformats.org/drawingml/2006/main" xmlns:r="http://schemas.openxmlformats.org/officeDocument/2006/relationships" xmlns:p="http://schemas.openxmlformats.org/presentationml/2006/main">
-  <p:cSld>
-    <p:spTree>
-      <p:nvGrpSpPr>
-        <p:cNvPr id="1" name=""/>
-        <p:cNvGrpSpPr/>
-        <p:nvPr/>
-      </p:nvGrpSpPr>
-      <p:grpSpPr>
-        <a:xfrm>
-          <a:off x="0" y="0"/>
-          <a:ext cx="0" cy="0"/>
-          <a:chOff x="0" y="0"/>
-          <a:chExt cx="0" cy="0"/>
-        </a:xfrm>
-      </p:grpSpPr>
-      <p:sp>
-        <p:nvSpPr>
-          <p:cNvPr id="31745" name="Title 1"/>
-          <p:cNvSpPr>
-            <a:spLocks noGrp="1"/>
-          </p:cNvSpPr>
-          <p:nvPr>
-            <p:ph type="title"/>
-          </p:nvPr>
-        </p:nvSpPr>
-        <p:spPr>
-          <a:xfrm>
-            <a:off x="152400" y="-26988"/>
-            <a:ext cx="8839200" cy="1143001"/>
-          </a:xfrm>
-        </p:spPr>
-        <p:txBody>
-          <a:bodyPr/>
-          <a:lstStyle/>
-          <a:p>
-            <a:r>
-              <a:rPr lang="en-US">
-                <a:latin typeface="Calibri" charset="0"/>
-                <a:ea typeface="ＭＳ Ｐゴシック" charset="0"/>
-              </a:rPr>
-              <a:t>What if I return to my lab and can not get this to work on my own data?</a:t>
-            </a:r>
-          </a:p>
-        </p:txBody>
-      </p:sp>
-      <p:sp>
-        <p:nvSpPr>
-          <p:cNvPr id="31746" name="Content Placeholder 2"/>
-          <p:cNvSpPr>
-            <a:spLocks noGrp="1"/>
-          </p:cNvSpPr>
-          <p:nvPr>
-            <p:ph idx="1"/>
-          </p:nvPr>
-        </p:nvSpPr>
-        <p:spPr/>
-        <p:txBody>
-          <a:bodyPr/>
-          <a:lstStyle/>
-          <a:p>
-            <a:r>
-              <a:rPr lang="en-US">
-                <a:latin typeface="Calibri" charset="0"/>
-                <a:ea typeface="ＭＳ Ｐゴシック" charset="0"/>
-              </a:rPr>
-              <a:t>Refer to the materials provided with this course for clues</a:t>
-            </a:r>
-          </a:p>
-          <a:p>
-            <a:r>
-              <a:rPr lang="en-US">
-                <a:latin typeface="Calibri" charset="0"/>
-                <a:ea typeface="ＭＳ Ｐゴシック" charset="0"/>
-              </a:rPr>
-              <a:t>Refer to the Nature Protocols tutorial (Trapnell et al. 2012)</a:t>
-            </a:r>
-          </a:p>
-          <a:p>
-            <a:pPr lvl="1"/>
-            <a:r>
-              <a:rPr lang="en-US">
-                <a:latin typeface="Calibri" charset="0"/>
-                <a:ea typeface="ＭＳ Ｐゴシック" charset="0"/>
-              </a:rPr>
-              <a:t>In particular refer to the troubleshooting table (next slide)</a:t>
-            </a:r>
-          </a:p>
-          <a:p>
-            <a:r>
-              <a:rPr lang="en-US">
-                <a:latin typeface="Calibri" charset="0"/>
-                <a:ea typeface="ＭＳ Ｐゴシック" charset="0"/>
-              </a:rPr>
-              <a:t>Search BioStars, SeqAnswers, and Google</a:t>
-            </a:r>
-          </a:p>
-          <a:p>
-            <a:pPr lvl="1"/>
-            <a:r>
-              <a:rPr lang="en-US">
-                <a:latin typeface="Calibri" charset="0"/>
-                <a:ea typeface="ＭＳ Ｐゴシック" charset="0"/>
-                <a:hlinkClick r:id="rId3"/>
-              </a:rPr>
-              <a:t>http://www.biostars.org/</a:t>
-            </a:r>
-            <a:endParaRPr lang="en-US">
-              <a:latin typeface="Calibri" charset="0"/>
-              <a:ea typeface="ＭＳ Ｐゴシック" charset="0"/>
-            </a:endParaRPr>
-          </a:p>
-          <a:p>
-            <a:pPr lvl="1"/>
-            <a:r>
-              <a:rPr lang="en-US">
-                <a:latin typeface="Calibri" charset="0"/>
-                <a:ea typeface="ＭＳ Ｐゴシック" charset="0"/>
-                <a:hlinkClick r:id="rId4"/>
-              </a:rPr>
-              <a:t>http://www.seqanswers.com</a:t>
-            </a:r>
-            <a:endParaRPr lang="en-US">
-              <a:latin typeface="Calibri" charset="0"/>
-              <a:ea typeface="ＭＳ Ｐゴシック" charset="0"/>
-            </a:endParaRPr>
-          </a:p>
-          <a:p>
-            <a:r>
-              <a:rPr lang="en-US">
-                <a:latin typeface="Calibri" charset="0"/>
-                <a:ea typeface="ＭＳ Ｐゴシック" charset="0"/>
-              </a:rPr>
-              <a:t>If your question is not already answered on BioStars...</a:t>
-            </a:r>
-          </a:p>
-          <a:p>
-            <a:pPr lvl="1"/>
-            <a:r>
-              <a:rPr lang="en-US">
-                <a:latin typeface="Calibri" charset="0"/>
-                <a:ea typeface="ＭＳ Ｐゴシック" charset="0"/>
-              </a:rPr>
-              <a:t>Ask it!  Then follow up so that others that have the same problem in the future know whether this solution worked</a:t>
-            </a:r>
-          </a:p>
-        </p:txBody>
-      </p:sp>
-    </p:spTree>
-    <p:extLst>
-      <p:ext uri="{BB962C8B-B14F-4D97-AF65-F5344CB8AC3E}">
-        <p14:creationId xmlns:p14="http://schemas.microsoft.com/office/powerpoint/2010/main" val="77235085"/>
-      </p:ext>
-    </p:extLst>
-  </p:cSld>
-  <p:clrMapOvr>
-    <a:masterClrMapping/>
-  </p:clrMapOvr>
-  <p:timing>
-    <p:tnLst>
-      <p:par>
-        <p:cTn xmlns:p14="http://schemas.microsoft.com/office/powerpoint/2010/main" id="1" dur="indefinite" restart="never" nodeType="tmRoot"/>
-      </p:par>
-    </p:tnLst>
-  </p:timing>
-</p:sld>
-</file>
-
-<file path=ppt/slides/slide13.xml><?xml version="1.0" encoding="utf-8"?>
-<p:sld xmlns:a="http://schemas.openxmlformats.org/drawingml/2006/main" xmlns:r="http://schemas.openxmlformats.org/officeDocument/2006/relationships" xmlns:p="http://schemas.openxmlformats.org/presentationml/2006/main">
-  <p:cSld>
-    <p:spTree>
-      <p:nvGrpSpPr>
-        <p:cNvPr id="1" name=""/>
-        <p:cNvGrpSpPr/>
-        <p:nvPr/>
-      </p:nvGrpSpPr>
-      <p:grpSpPr>
-        <a:xfrm>
-          <a:off x="0" y="0"/>
-          <a:ext cx="0" cy="0"/>
-          <a:chOff x="0" y="0"/>
-          <a:chExt cx="0" cy="0"/>
-        </a:xfrm>
-      </p:grpSpPr>
-      <p:sp>
-        <p:nvSpPr>
-          <p:cNvPr id="33793" name="Title 1"/>
-          <p:cNvSpPr>
-            <a:spLocks noGrp="1"/>
-          </p:cNvSpPr>
-          <p:nvPr>
-            <p:ph type="title"/>
-          </p:nvPr>
-        </p:nvSpPr>
-        <p:spPr>
-          <a:xfrm>
-            <a:off x="152400" y="-26988"/>
-            <a:ext cx="8839200" cy="1143001"/>
-          </a:xfrm>
-        </p:spPr>
-        <p:txBody>
-          <a:bodyPr/>
-          <a:lstStyle/>
-          <a:p>
-            <a:r>
-              <a:rPr lang="en-US">
-                <a:latin typeface="Calibri" charset="0"/>
-                <a:ea typeface="ＭＳ Ｐゴシック" charset="0"/>
-              </a:rPr>
-              <a:t>TopHat/Cufflinks/Cuffdiff troubleshooting table</a:t>
-            </a:r>
-          </a:p>
-        </p:txBody>
-      </p:sp>
-      <p:pic>
-        <p:nvPicPr>
-          <p:cNvPr id="33794" name="Content Placeholder 3" descr="Troubleshooting guide.png"/>
-          <p:cNvPicPr>
-            <a:picLocks noGrp="1" noChangeAspect="1"/>
-          </p:cNvPicPr>
-          <p:nvPr>
-            <p:ph idx="1"/>
-          </p:nvPr>
-        </p:nvPicPr>
-        <p:blipFill>
-          <a:blip r:embed="rId3">
-            <a:extLst>
-              <a:ext uri="{28A0092B-C50C-407E-A947-70E740481C1C}">
-                <a14:useLocalDpi xmlns:a14="http://schemas.microsoft.com/office/drawing/2010/main" val="0"/>
-              </a:ext>
-            </a:extLst>
-          </a:blip>
-          <a:srcRect t="-8340" b="-8340"/>
-          <a:stretch>
-            <a:fillRect/>
-          </a:stretch>
-        </p:blipFill>
-        <p:spPr/>
-      </p:pic>
-    </p:spTree>
-    <p:extLst>
-      <p:ext uri="{BB962C8B-B14F-4D97-AF65-F5344CB8AC3E}">
-        <p14:creationId xmlns:p14="http://schemas.microsoft.com/office/powerpoint/2010/main" val="1132413270"/>
-      </p:ext>
-    </p:extLst>
-  </p:cSld>
-  <p:clrMapOvr>
-    <a:masterClrMapping/>
-  </p:clrMapOvr>
-  <p:timing>
-    <p:tnLst>
-      <p:par>
-        <p:cTn xmlns:p14="http://schemas.microsoft.com/office/powerpoint/2010/main" id="1" dur="indefinite" restart="never" nodeType="tmRoot"/>
-      </p:par>
-    </p:tnLst>
-  </p:timing>
-</p:sld>
-</file>
-
-<file path=ppt/slides/slide14.xml><?xml version="1.0" encoding="utf-8"?>
 <p:sld xmlns:a="http://schemas.openxmlformats.org/drawingml/2006/main" xmlns:r="http://schemas.openxmlformats.org/officeDocument/2006/relationships" xmlns:p="http://schemas.openxmlformats.org/presentationml/2006/main">
   <p:cSld>
     <p:spTree>
@@ -8354,13 +7600,6 @@
               </a:rPr>
               <a:t>Isoform Discovery and Alternative Expression (tutorial)</a:t>
             </a:r>
-            <a:endParaRPr lang="en-US" sz="2000" dirty="0">
-              <a:solidFill>
-                <a:schemeClr val="bg1"/>
-              </a:solidFill>
-              <a:latin typeface="Calibri" charset="0"/>
-              <a:cs typeface="Segoe UI" charset="0"/>
-            </a:endParaRPr>
           </a:p>
         </p:txBody>
       </p:sp>
@@ -8731,7 +7970,7 @@
                 <a:latin typeface="Calibri" charset="0"/>
                 <a:ea typeface="ＭＳ Ｐゴシック" charset="0"/>
               </a:rPr>
-              <a:t>Cuffdiff</a:t>
+              <a:t>Ballgown</a:t>
             </a:r>
             <a:endParaRPr lang="en-US" dirty="0" smtClean="0">
               <a:latin typeface="Calibri" charset="0"/>
@@ -8747,7 +7986,63 @@
                 <a:latin typeface="Calibri" charset="0"/>
                 <a:ea typeface="ＭＳ Ｐゴシック" charset="0"/>
               </a:rPr>
-              <a:t>Examine junctions counts and Cufflinks differential splicing files at the command line</a:t>
+              <a:t>Examine junctions counts </a:t>
+            </a:r>
+            <a:r>
+              <a:rPr lang="en-US" dirty="0" smtClean="0">
+                <a:latin typeface="Calibri" charset="0"/>
+                <a:ea typeface="ＭＳ Ｐゴシック" charset="0"/>
+              </a:rPr>
+              <a:t>with </a:t>
+            </a:r>
+            <a:r>
+              <a:rPr lang="en-US" dirty="0" err="1" smtClean="0">
+                <a:latin typeface="Calibri" charset="0"/>
+                <a:ea typeface="ＭＳ Ｐゴシック" charset="0"/>
+              </a:rPr>
+              <a:t>RegTools</a:t>
+            </a:r>
+            <a:r>
+              <a:rPr lang="en-US" dirty="0" smtClean="0">
+                <a:latin typeface="Calibri" charset="0"/>
+                <a:ea typeface="ＭＳ Ｐゴシック" charset="0"/>
+              </a:rPr>
+              <a:t> and </a:t>
+            </a:r>
+            <a:r>
+              <a:rPr lang="en-US" dirty="0" err="1" smtClean="0">
+                <a:latin typeface="Calibri" charset="0"/>
+                <a:ea typeface="ＭＳ Ｐゴシック" charset="0"/>
+              </a:rPr>
+              <a:t>StringTie</a:t>
+            </a:r>
+            <a:r>
+              <a:rPr lang="en-US" dirty="0" smtClean="0">
+                <a:latin typeface="Calibri" charset="0"/>
+                <a:ea typeface="ＭＳ Ｐゴシック" charset="0"/>
+              </a:rPr>
+              <a:t> alternative </a:t>
+            </a:r>
+            <a:r>
+              <a:rPr lang="en-US" dirty="0" smtClean="0">
+                <a:latin typeface="Calibri" charset="0"/>
+                <a:ea typeface="ＭＳ Ｐゴシック" charset="0"/>
+              </a:rPr>
+              <a:t>transcript </a:t>
+            </a:r>
+            <a:r>
+              <a:rPr lang="en-US" dirty="0" smtClean="0">
+                <a:latin typeface="Calibri" charset="0"/>
+                <a:ea typeface="ＭＳ Ｐゴシック" charset="0"/>
+              </a:rPr>
+              <a:t>files </a:t>
+            </a:r>
+            <a:r>
+              <a:rPr lang="en-US" dirty="0" smtClean="0">
+                <a:latin typeface="Calibri" charset="0"/>
+                <a:ea typeface="ＭＳ Ｐゴシック" charset="0"/>
+              </a:rPr>
+              <a:t>at the command line</a:t>
             </a:r>
           </a:p>
           <a:p>
@@ -8759,21 +8054,35 @@
                 <a:latin typeface="Calibri" charset="0"/>
                 <a:ea typeface="ＭＳ Ｐゴシック" charset="0"/>
               </a:rPr>
-              <a:t>Visualize </a:t>
+              <a:t>Visualize junction </a:t>
+            </a:r>
+            <a:r>
+              <a:rPr lang="en-US" dirty="0" smtClean="0">
+                <a:latin typeface="Calibri" charset="0"/>
+                <a:ea typeface="ＭＳ Ｐゴシック" charset="0"/>
+              </a:rPr>
+              <a:t>counts and </a:t>
             </a:r>
             <a:r>
               <a:rPr lang="en-US" dirty="0" err="1" smtClean="0">
                 <a:latin typeface="Calibri" charset="0"/>
                 <a:ea typeface="ＭＳ Ｐゴシック" charset="0"/>
               </a:rPr>
-              <a:t>TopHat</a:t>
+              <a:t>StringTie</a:t>
             </a:r>
             <a:r>
               <a:rPr lang="en-US" dirty="0" smtClean="0">
                 <a:latin typeface="Calibri" charset="0"/>
                 <a:ea typeface="ＭＳ Ｐゴシック" charset="0"/>
               </a:rPr>
-              <a:t> junction counts and Cufflinks assembled transcripts in IGV</a:t>
+              <a:t> </a:t>
+            </a:r>
+            <a:r>
+              <a:rPr lang="en-US" dirty="0" smtClean="0">
+                <a:latin typeface="Calibri" charset="0"/>
+                <a:ea typeface="ＭＳ Ｐゴシック" charset="0"/>
+              </a:rPr>
+              <a:t>assembled transcripts in IGV</a:t>
             </a:r>
             <a:endParaRPr lang="en-US" dirty="0">
               <a:latin typeface="Calibri" charset="0"/>
@@ -8847,18 +8156,25 @@
               <a:t>5-i,ii. Running </a:t>
             </a:r>
             <a:r>
-              <a:rPr lang="en-US" dirty="0" err="1">
+              <a:rPr lang="en-US" dirty="0" err="1" smtClean="0">
                 <a:latin typeface="Calibri" charset="0"/>
                 <a:ea typeface="ＭＳ Ｐゴシック" charset="0"/>
               </a:rPr>
-              <a:t>cuffinks</a:t>
+              <a:t>stringtie</a:t>
+            </a:r>
+            <a:r>
+              <a:rPr lang="en-US" dirty="0" smtClean="0">
+                <a:latin typeface="Calibri" charset="0"/>
+                <a:ea typeface="ＭＳ Ｐゴシック" charset="0"/>
+              </a:rPr>
+              <a:t> in </a:t>
             </a:r>
             <a:r>
               <a:rPr lang="en-US" dirty="0">
                 <a:latin typeface="Calibri" charset="0"/>
                 <a:ea typeface="ＭＳ Ｐゴシック" charset="0"/>
               </a:rPr>
-              <a:t> in ‘ref-guided’ and ‘de-novo’ mode</a:t>
+              <a:t>‘ref-guided’ and ‘de-novo’ mode</a:t>
             </a:r>
           </a:p>
         </p:txBody>
@@ -8885,7 +8201,23 @@
             </a:pPr>
             <a:r>
               <a:rPr lang="en-US" dirty="0" smtClean="0"/>
-              <a:t>In Module 3 we ran cufflinks in ‘ref-only’ mode.  This mode gives us an expression estimate for each known gene/transcript</a:t>
+              <a:t>In Module 3 we ran </a:t>
+            </a:r>
+            <a:r>
+              <a:rPr lang="en-US" dirty="0" err="1" smtClean="0"/>
+              <a:t>StringTie</a:t>
+            </a:r>
+            <a:r>
+              <a:rPr lang="en-US" dirty="0" smtClean="0"/>
+              <a:t> </a:t>
+            </a:r>
+            <a:r>
+              <a:rPr lang="en-US" dirty="0" smtClean="0"/>
+              <a:t>in </a:t>
+            </a:r>
+            <a:r>
+              <a:rPr lang="en-US" dirty="0" smtClean="0"/>
+              <a:t>‘ref-only’ mode.  This mode gives us an expression estimate for each known gene/transcript</a:t>
             </a:r>
           </a:p>
           <a:p>
@@ -8985,12 +8317,16 @@
           <a:lstStyle/>
           <a:p>
             <a:r>
-              <a:rPr lang="en-US">
+              <a:rPr lang="en-US" dirty="0" smtClean="0">
                 <a:latin typeface="Calibri" charset="0"/>
                 <a:ea typeface="ＭＳ Ｐゴシック" charset="0"/>
               </a:rPr>
-              <a:t>‘-g’, ‘-G’ woe is me...</a:t>
-            </a:r>
+              <a:t>Options that govern use of existing transcript information</a:t>
+            </a:r>
+            <a:endParaRPr lang="en-US" dirty="0">
+              <a:latin typeface="Calibri" charset="0"/>
+              <a:ea typeface="ＭＳ Ｐゴシック" charset="0"/>
+            </a:endParaRPr>
           </a:p>
         </p:txBody>
       </p:sp>
@@ -9012,7 +8348,7 @@
         </p:spPr>
         <p:txBody>
           <a:bodyPr>
-            <a:normAutofit fontScale="62500" lnSpcReduction="20000"/>
+            <a:normAutofit fontScale="70000" lnSpcReduction="20000"/>
           </a:bodyPr>
           <a:lstStyle/>
           <a:p>
@@ -9020,22 +8356,32 @@
               <a:defRPr/>
             </a:pPr>
             <a:r>
-              <a:rPr lang="en-US" dirty="0" err="1" smtClean="0"/>
-              <a:t>tophat</a:t>
-            </a:r>
-            <a:r>
               <a:rPr lang="en-US" dirty="0" smtClean="0"/>
-              <a:t> has a ‘-G’ option</a:t>
-            </a:r>
+              <a:t>During indexing of the genome with hisat2, transcript information is provided</a:t>
+            </a:r>
+            <a:endParaRPr lang="en-US" dirty="0" smtClean="0"/>
           </a:p>
           <a:p>
             <a:pPr lvl="1">
               <a:defRPr/>
             </a:pPr>
             <a:r>
+              <a:rPr lang="en-US" dirty="0"/>
+              <a:t>A</a:t>
+            </a:r>
+            <a:r>
               <a:rPr lang="en-US" dirty="0" smtClean="0"/>
-              <a:t>Used to supply a transcriptome GTF file</a:t>
-            </a:r>
+              <a:t> </a:t>
+            </a:r>
+            <a:r>
+              <a:rPr lang="en-US" dirty="0" smtClean="0"/>
+              <a:t>transcriptome GTF </a:t>
+            </a:r>
+            <a:r>
+              <a:rPr lang="en-US" dirty="0" smtClean="0"/>
+              <a:t>file is used to extract splice sites and exons</a:t>
+            </a:r>
+            <a:endParaRPr lang="en-US" dirty="0" smtClean="0"/>
           </a:p>
           <a:p>
             <a:pPr lvl="1">
@@ -9043,15 +8389,7 @@
             </a:pPr>
             <a:r>
               <a:rPr lang="en-US" dirty="0" smtClean="0"/>
-              <a:t>This will be used to </a:t>
-            </a:r>
-            <a:r>
-              <a:rPr lang="en-US" b="1" dirty="0" smtClean="0"/>
-              <a:t>assist the alignment</a:t>
-            </a:r>
-            <a:r>
-              <a:rPr lang="en-US" dirty="0" smtClean="0"/>
-              <a:t> step by allowing alignment to both transcriptome and genome sequences</a:t>
+              <a:t>These are supplied during the index step to build a better index</a:t>
             </a:r>
           </a:p>
           <a:p>
@@ -9060,7 +8398,19 @@
             </a:pPr>
             <a:r>
               <a:rPr lang="en-US" dirty="0" smtClean="0"/>
-              <a:t>Coordinates from alignments to transcriptomes will be converted back to genome coordinates</a:t>
+              <a:t>These </a:t>
+            </a:r>
+            <a:r>
+              <a:rPr lang="en-US" dirty="0" smtClean="0"/>
+              <a:t>will be used to </a:t>
+            </a:r>
+            <a:r>
+              <a:rPr lang="en-US" b="1" dirty="0" smtClean="0"/>
+              <a:t>assist the alignment</a:t>
+            </a:r>
+            <a:r>
+              <a:rPr lang="en-US" dirty="0" smtClean="0"/>
+              <a:t> step by allowing alignment to both transcriptome and genome sequences</a:t>
             </a:r>
           </a:p>
           <a:p>
@@ -9069,32 +8419,58 @@
             </a:pPr>
             <a:r>
               <a:rPr lang="en-US" dirty="0" smtClean="0"/>
-              <a:t>Even though we supply a transcriptome, </a:t>
-            </a:r>
-            <a:r>
-              <a:rPr lang="en-US" dirty="0" err="1" smtClean="0"/>
-              <a:t>tophat</a:t>
-            </a:r>
+              <a:t>Coordinates from alignments to transcriptomes will be converted back to genome coordinates</a:t>
+            </a:r>
+          </a:p>
+          <a:p>
+            <a:pPr lvl="1">
+              <a:defRPr/>
+            </a:pPr>
             <a:r>
               <a:rPr lang="en-US" dirty="0" smtClean="0"/>
-              <a:t> will not be limited in anyway to known transcripts</a:t>
-            </a:r>
+              <a:t>Even though we supply </a:t>
+            </a:r>
+            <a:r>
+              <a:rPr lang="en-US" dirty="0" smtClean="0"/>
+              <a:t>transcriptome info, hisat2 </a:t>
+            </a:r>
+            <a:r>
+              <a:rPr lang="en-US" dirty="0" smtClean="0"/>
+              <a:t>will not be limited in </a:t>
+            </a:r>
+            <a:r>
+              <a:rPr lang="en-US" dirty="0" smtClean="0"/>
+              <a:t>to </a:t>
+            </a:r>
+            <a:r>
+              <a:rPr lang="en-US" dirty="0" smtClean="0"/>
+              <a:t>known </a:t>
+            </a:r>
+            <a:r>
+              <a:rPr lang="en-US" dirty="0" smtClean="0"/>
+              <a:t>transcripts or splice sites</a:t>
+            </a:r>
+            <a:endParaRPr lang="en-US" dirty="0" smtClean="0"/>
           </a:p>
           <a:p>
             <a:pPr>
               <a:defRPr/>
             </a:pPr>
             <a:r>
-              <a:rPr lang="en-US" dirty="0" err="1"/>
-              <a:t>t</a:t>
-            </a:r>
-            <a:r>
               <a:rPr lang="en-US" dirty="0" err="1" smtClean="0"/>
-              <a:t>ophat</a:t>
+              <a:t>Stringtie</a:t>
             </a:r>
             <a:r>
               <a:rPr lang="en-US" dirty="0" smtClean="0"/>
-              <a:t>  also has a ‘-g’ option</a:t>
+              <a:t> </a:t>
+            </a:r>
+            <a:r>
+              <a:rPr lang="en-US" dirty="0" smtClean="0"/>
+              <a:t>‘-G’ </a:t>
+            </a:r>
+            <a:r>
+              <a:rPr lang="en-US" dirty="0" smtClean="0"/>
+              <a:t>option</a:t>
             </a:r>
           </a:p>
           <a:p>
@@ -9103,25 +8479,69 @@
             </a:pPr>
             <a:r>
               <a:rPr lang="en-US" dirty="0" smtClean="0"/>
-              <a:t>Used to specify the maximum number of multiple mappings for a </a:t>
-            </a:r>
-            <a:r>
-              <a:rPr lang="en-US" smtClean="0"/>
-              <a:t>single read</a:t>
-            </a:r>
-            <a:endParaRPr lang="en-US" dirty="0" smtClean="0"/>
+              <a:t>Used to supply a transcriptome GTF file</a:t>
+            </a:r>
+          </a:p>
+          <a:p>
+            <a:pPr lvl="1">
+              <a:defRPr/>
+            </a:pPr>
+            <a:r>
+              <a:rPr lang="en-US" dirty="0" smtClean="0"/>
+              <a:t>If specified, </a:t>
+            </a:r>
+            <a:r>
+              <a:rPr lang="en-US" dirty="0" smtClean="0"/>
+              <a:t>u</a:t>
+            </a:r>
+            <a:r>
+              <a:rPr lang="en-US" dirty="0" smtClean="0"/>
+              <a:t>ses </a:t>
+            </a:r>
+            <a:r>
+              <a:rPr lang="en-US" dirty="0"/>
+              <a:t>the reference annotation file (in GTF or GFF3 format) to guide the assembly process. We </a:t>
+            </a:r>
+            <a:r>
+              <a:rPr lang="en-US" dirty="0" smtClean="0"/>
+              <a:t>call this the ‘</a:t>
+            </a:r>
+            <a:r>
+              <a:rPr lang="en-US" b="1" dirty="0" smtClean="0"/>
+              <a:t>ref</a:t>
+            </a:r>
+            <a:r>
+              <a:rPr lang="en-US" b="1" dirty="0" smtClean="0"/>
+              <a:t>-</a:t>
+            </a:r>
+            <a:r>
+              <a:rPr lang="en-US" b="1" dirty="0" smtClean="0"/>
+              <a:t>guided</a:t>
+            </a:r>
+            <a:r>
+              <a:rPr lang="en-US" dirty="0" smtClean="0"/>
+              <a:t>’ </a:t>
+            </a:r>
+            <a:r>
+              <a:rPr lang="en-US" dirty="0" smtClean="0"/>
+              <a:t>analysis mode</a:t>
+            </a:r>
           </a:p>
           <a:p>
             <a:pPr>
               <a:defRPr/>
             </a:pPr>
             <a:r>
-              <a:rPr lang="en-US" dirty="0"/>
-              <a:t>c</a:t>
+              <a:rPr lang="en-US" dirty="0" err="1" smtClean="0"/>
+              <a:t>Stringtie</a:t>
             </a:r>
             <a:r>
               <a:rPr lang="en-US" dirty="0" smtClean="0"/>
-              <a:t>ufflinks has a ‘-G’ option</a:t>
+              <a:t> ‘-e’ </a:t>
+            </a:r>
+            <a:r>
+              <a:rPr lang="en-US" dirty="0" smtClean="0"/>
+              <a:t>option</a:t>
             </a:r>
           </a:p>
           <a:p>
@@ -9129,8 +8549,16 @@
               <a:defRPr/>
             </a:pPr>
             <a:r>
-              <a:rPr lang="en-US" dirty="0" smtClean="0"/>
-              <a:t>Used to supply a transcriptome GTF file</a:t>
+              <a:rPr lang="en-US" dirty="0"/>
+              <a:t>Limits the processing of read alignments to </a:t>
+            </a:r>
+            <a:r>
+              <a:rPr lang="en-US" u="sng" dirty="0"/>
+              <a:t>only</a:t>
+            </a:r>
+            <a:r>
+              <a:rPr lang="en-US" dirty="0"/>
+              <a:t> estimate and output the assembled transcripts matching the reference transcripts given with the -G option</a:t>
             </a:r>
           </a:p>
           <a:p>
@@ -9139,16 +8567,54 @@
             </a:pPr>
             <a:r>
               <a:rPr lang="en-US" dirty="0" smtClean="0"/>
-              <a:t>If specified, cufflinks will quantitate </a:t>
-            </a:r>
-            <a:r>
-              <a:rPr lang="en-US" dirty="0"/>
-              <a:t>against reference transcript </a:t>
+              <a:t>We </a:t>
             </a:r>
             <a:r>
               <a:rPr lang="en-US" dirty="0" smtClean="0"/>
-              <a:t>annotations</a:t>
-            </a:r>
+              <a:t>call this ‘</a:t>
+            </a:r>
+            <a:r>
+              <a:rPr lang="en-US" b="1" dirty="0" smtClean="0"/>
+              <a:t>reference</a:t>
+            </a:r>
+            <a:r>
+              <a:rPr lang="en-US" b="1" dirty="0" smtClean="0"/>
+              <a:t>-only</a:t>
+            </a:r>
+            <a:r>
+              <a:rPr lang="en-US" dirty="0" smtClean="0"/>
+              <a:t>’ </a:t>
+            </a:r>
+            <a:r>
+              <a:rPr lang="en-US" dirty="0" smtClean="0"/>
+              <a:t>analysis mode</a:t>
+            </a:r>
+          </a:p>
+          <a:p>
+            <a:pPr>
+              <a:defRPr/>
+            </a:pPr>
+            <a:r>
+              <a:rPr lang="en-US" dirty="0" smtClean="0"/>
+              <a:t>Running </a:t>
+            </a:r>
+            <a:r>
+              <a:rPr lang="en-US" dirty="0" err="1" smtClean="0"/>
+              <a:t>StringTie</a:t>
+            </a:r>
+            <a:r>
+              <a:rPr lang="en-US" dirty="0" smtClean="0"/>
+              <a:t> </a:t>
+            </a:r>
+            <a:r>
+              <a:rPr lang="en-US" dirty="0" smtClean="0"/>
+              <a:t>with neither ‘-G’ or ‘</a:t>
+            </a:r>
+            <a:r>
+              <a:rPr lang="en-US" dirty="0" smtClean="0"/>
+              <a:t>-e’</a:t>
+            </a:r>
+            <a:endParaRPr lang="en-US" dirty="0" smtClean="0"/>
           </a:p>
           <a:p>
             <a:pPr lvl="1">
@@ -9156,112 +8622,47 @@
             </a:pPr>
             <a:r>
               <a:rPr lang="en-US" dirty="0" smtClean="0"/>
-              <a:t>We call this the ‘ref-only’ analysis mode</a:t>
-            </a:r>
-          </a:p>
-          <a:p>
-            <a:pPr>
-              <a:defRPr/>
-            </a:pPr>
-            <a:r>
-              <a:rPr lang="en-US" dirty="0"/>
-              <a:t>c</a:t>
+              <a:t>We call this ‘</a:t>
+            </a:r>
+            <a:r>
+              <a:rPr lang="en-US" b="1" dirty="0" smtClean="0"/>
+              <a:t>de-novo</a:t>
             </a:r>
             <a:r>
               <a:rPr lang="en-US" dirty="0" smtClean="0"/>
-              <a:t>ufflinks also has a ‘-g’ option</a:t>
-            </a:r>
-          </a:p>
-          <a:p>
-            <a:pPr lvl="1">
-              <a:defRPr/>
-            </a:pPr>
+              <a:t>’ analysis </a:t>
+            </a:r>
             <a:r>
               <a:rPr lang="en-US" dirty="0" smtClean="0"/>
-              <a:t>Use to supply a transcriptome GTF file</a:t>
-            </a:r>
-          </a:p>
-          <a:p>
-            <a:pPr lvl="1">
-              <a:defRPr/>
-            </a:pPr>
-            <a:r>
-              <a:rPr lang="en-US" dirty="0"/>
-              <a:t>U</a:t>
-            </a:r>
-            <a:r>
-              <a:rPr lang="en-US" dirty="0" smtClean="0"/>
-              <a:t>se </a:t>
-            </a:r>
-            <a:r>
-              <a:rPr lang="en-US" dirty="0"/>
-              <a:t>reference transcript </a:t>
-            </a:r>
-            <a:r>
-              <a:rPr lang="en-US" dirty="0" smtClean="0"/>
-              <a:t>annotations </a:t>
-            </a:r>
-            <a:r>
-              <a:rPr lang="en-US" dirty="0"/>
-              <a:t>to </a:t>
-            </a:r>
-            <a:r>
-              <a:rPr lang="en-US" b="1" dirty="0"/>
-              <a:t>guide </a:t>
-            </a:r>
-            <a:r>
-              <a:rPr lang="en-US" b="1" dirty="0" smtClean="0"/>
-              <a:t>assembly</a:t>
-            </a:r>
-          </a:p>
-          <a:p>
-            <a:pPr lvl="1">
-              <a:defRPr/>
-            </a:pPr>
-            <a:r>
-              <a:rPr lang="en-US" dirty="0" smtClean="0"/>
-              <a:t>We call this ‘reference-guided’ analysis mode</a:t>
-            </a:r>
-          </a:p>
-          <a:p>
-            <a:pPr>
-              <a:defRPr/>
-            </a:pPr>
-            <a:r>
-              <a:rPr lang="en-US" dirty="0" smtClean="0"/>
-              <a:t>Running cufflinks with neither ‘-G’ or ‘-g’</a:t>
-            </a:r>
-          </a:p>
-          <a:p>
-            <a:pPr lvl="1">
-              <a:defRPr/>
-            </a:pPr>
-            <a:r>
-              <a:rPr lang="en-US" dirty="0" smtClean="0"/>
-              <a:t>We call this ‘de-novo’ analysis mode</a:t>
-            </a:r>
-          </a:p>
-          <a:p>
-            <a:pPr>
-              <a:defRPr/>
-            </a:pPr>
-            <a:r>
-              <a:rPr lang="en-US" dirty="0" err="1"/>
-              <a:t>c</a:t>
-            </a:r>
-            <a:r>
-              <a:rPr lang="en-US" dirty="0" err="1" smtClean="0"/>
-              <a:t>uffdiff</a:t>
-            </a:r>
-            <a:r>
-              <a:rPr lang="en-US" dirty="0" smtClean="0"/>
-              <a:t>  requires a GTF file but it is not specified with a ‘-G’ or ‘-g’ option, but rather is simply supplied as a file path when you run </a:t>
-            </a:r>
-            <a:r>
-              <a:rPr lang="en-US" dirty="0" err="1" smtClean="0"/>
-              <a:t>cuffdiff</a:t>
+              <a:t>mode</a:t>
             </a:r>
             <a:endParaRPr lang="en-US" dirty="0" smtClean="0"/>
+          </a:p>
+        </p:txBody>
+      </p:sp>
+      <p:sp>
+        <p:nvSpPr>
+          <p:cNvPr id="2" name="TextBox 1"/>
+          <p:cNvSpPr txBox="1"/>
+          <p:nvPr/>
+        </p:nvSpPr>
+        <p:spPr>
+          <a:xfrm>
+            <a:off x="-803996" y="2621448"/>
+            <a:ext cx="184666" cy="461665"/>
+          </a:xfrm>
+          <a:prstGeom prst="rect">
+            <a:avLst/>
+          </a:prstGeom>
+          <a:noFill/>
+        </p:spPr>
+        <p:txBody>
+          <a:bodyPr wrap="none" rtlCol="0">
+            <a:spAutoFit/>
+          </a:bodyPr>
+          <a:lstStyle/>
+          <a:p>
+            <a:endParaRPr lang="en-US"/>
           </a:p>
         </p:txBody>
       </p:sp>
@@ -9323,34 +8724,41 @@
           <a:lstStyle/>
           <a:p>
             <a:r>
-              <a:rPr lang="en-US">
+              <a:rPr lang="en-US" dirty="0" smtClean="0">
                 <a:latin typeface="Calibri" charset="0"/>
                 <a:ea typeface="ＭＳ Ｐゴシック" charset="0"/>
               </a:rPr>
-              <a:t>The tophat ‘</a:t>
-            </a:r>
-            <a:r>
-              <a:rPr lang="en-US" altLang="ja-JP">
+              <a:t>A </a:t>
+            </a:r>
+            <a:r>
+              <a:rPr lang="en-US" dirty="0">
+                <a:latin typeface="Calibri" charset="0"/>
+                <a:ea typeface="ＭＳ Ｐゴシック" charset="0"/>
+              </a:rPr>
+              <a:t>‘</a:t>
+            </a:r>
+            <a:r>
+              <a:rPr lang="en-US" altLang="ja-JP" dirty="0" err="1">
                 <a:latin typeface="Calibri" charset="0"/>
                 <a:ea typeface="ＭＳ Ｐゴシック" charset="0"/>
               </a:rPr>
               <a:t>junctions.bed</a:t>
             </a:r>
             <a:r>
-              <a:rPr lang="en-US">
+              <a:rPr lang="en-US" dirty="0">
                 <a:latin typeface="Calibri" charset="0"/>
                 <a:ea typeface="ＭＳ Ｐゴシック" charset="0"/>
               </a:rPr>
               <a:t>’</a:t>
             </a:r>
             <a:r>
-              <a:rPr lang="en-US" altLang="ja-JP">
+              <a:rPr lang="en-US" altLang="ja-JP" dirty="0">
                 <a:latin typeface="Calibri" charset="0"/>
                 <a:ea typeface="ＭＳ Ｐゴシック" charset="0"/>
               </a:rPr>
               <a:t> file</a:t>
             </a:r>
-            <a:endParaRPr lang="en-US">
+            <a:endParaRPr lang="en-US" dirty="0">
               <a:latin typeface="Calibri" charset="0"/>
               <a:ea typeface="ＭＳ Ｐゴシック" charset="0"/>
             </a:endParaRPr>
@@ -9378,17 +8786,31 @@
           <a:lstStyle/>
           <a:p>
             <a:r>
-              <a:rPr lang="en-US">
+              <a:rPr lang="en-US" dirty="0">
                 <a:latin typeface="Calibri" charset="0"/>
                 <a:ea typeface="ＭＳ Ｐゴシック" charset="0"/>
               </a:rPr>
-              <a:t>After alignment, tophat creates a summary of all reads that support exon-exon junctions</a:t>
+              <a:t>After alignment, </a:t>
+            </a:r>
+            <a:r>
+              <a:rPr lang="en-US" dirty="0" smtClean="0">
+                <a:latin typeface="Calibri" charset="0"/>
+                <a:ea typeface="ＭＳ Ｐゴシック" charset="0"/>
+              </a:rPr>
+              <a:t>we can create </a:t>
+            </a:r>
+            <a:r>
+              <a:rPr lang="en-US" dirty="0">
+                <a:latin typeface="Calibri" charset="0"/>
+                <a:ea typeface="ＭＳ Ｐゴシック" charset="0"/>
+              </a:rPr>
+              <a:t>a summary of all reads that support exon-exon junctions</a:t>
             </a:r>
           </a:p>
           <a:p>
             <a:pPr lvl="1"/>
             <a:r>
-              <a:rPr lang="en-US">
+              <a:rPr lang="en-US" dirty="0">
                 <a:latin typeface="Calibri" charset="0"/>
                 <a:ea typeface="ＭＳ Ｐゴシック" charset="0"/>
               </a:rPr>
@@ -9398,7 +8820,7 @@
           <a:p>
             <a:pPr lvl="1"/>
             <a:r>
-              <a:rPr lang="en-US">
+              <a:rPr lang="en-US" dirty="0">
                 <a:latin typeface="Calibri" charset="0"/>
                 <a:ea typeface="ＭＳ Ｐゴシック" charset="0"/>
               </a:rPr>
@@ -9407,7 +8829,7 @@
           </a:p>
           <a:p>
             <a:r>
-              <a:rPr lang="en-US">
+              <a:rPr lang="en-US" dirty="0">
                 <a:latin typeface="Calibri" charset="0"/>
                 <a:ea typeface="ＭＳ Ｐゴシック" charset="0"/>
               </a:rPr>
@@ -9417,7 +8839,7 @@
           <a:p>
             <a:pPr lvl="1"/>
             <a:r>
-              <a:rPr lang="en-US">
+              <a:rPr lang="en-US" dirty="0">
                 <a:latin typeface="Calibri" charset="0"/>
                 <a:ea typeface="ＭＳ Ｐゴシック" charset="0"/>
               </a:rPr>

</xml_diff>